<commit_message>
modified some errors needed to build qna part
</commit_message>
<xml_diff>
--- a/Preparation_test_0516/01_프로젝트시스템구성도.pptx
+++ b/Preparation_test_0516/01_프로젝트시스템구성도.pptx
@@ -243,7 +243,7 @@
           <a:p>
             <a:fld id="{ADCB3C24-BD18-4717-A32D-B583A5D3181D}" type="datetimeFigureOut">
               <a:rPr lang="ko-KR" altLang="en-US" smtClean="0"/>
-              <a:t>2023-05-15</a:t>
+              <a:t>2023-05-16</a:t>
             </a:fld>
             <a:endParaRPr lang="ko-KR" altLang="en-US"/>
           </a:p>
@@ -413,7 +413,7 @@
           <a:p>
             <a:fld id="{ADCB3C24-BD18-4717-A32D-B583A5D3181D}" type="datetimeFigureOut">
               <a:rPr lang="ko-KR" altLang="en-US" smtClean="0"/>
-              <a:t>2023-05-15</a:t>
+              <a:t>2023-05-16</a:t>
             </a:fld>
             <a:endParaRPr lang="ko-KR" altLang="en-US"/>
           </a:p>
@@ -593,7 +593,7 @@
           <a:p>
             <a:fld id="{ADCB3C24-BD18-4717-A32D-B583A5D3181D}" type="datetimeFigureOut">
               <a:rPr lang="ko-KR" altLang="en-US" smtClean="0"/>
-              <a:t>2023-05-15</a:t>
+              <a:t>2023-05-16</a:t>
             </a:fld>
             <a:endParaRPr lang="ko-KR" altLang="en-US"/>
           </a:p>
@@ -763,7 +763,7 @@
           <a:p>
             <a:fld id="{ADCB3C24-BD18-4717-A32D-B583A5D3181D}" type="datetimeFigureOut">
               <a:rPr lang="ko-KR" altLang="en-US" smtClean="0"/>
-              <a:t>2023-05-15</a:t>
+              <a:t>2023-05-16</a:t>
             </a:fld>
             <a:endParaRPr lang="ko-KR" altLang="en-US"/>
           </a:p>
@@ -1009,7 +1009,7 @@
           <a:p>
             <a:fld id="{ADCB3C24-BD18-4717-A32D-B583A5D3181D}" type="datetimeFigureOut">
               <a:rPr lang="ko-KR" altLang="en-US" smtClean="0"/>
-              <a:t>2023-05-15</a:t>
+              <a:t>2023-05-16</a:t>
             </a:fld>
             <a:endParaRPr lang="ko-KR" altLang="en-US"/>
           </a:p>
@@ -1241,7 +1241,7 @@
           <a:p>
             <a:fld id="{ADCB3C24-BD18-4717-A32D-B583A5D3181D}" type="datetimeFigureOut">
               <a:rPr lang="ko-KR" altLang="en-US" smtClean="0"/>
-              <a:t>2023-05-15</a:t>
+              <a:t>2023-05-16</a:t>
             </a:fld>
             <a:endParaRPr lang="ko-KR" altLang="en-US"/>
           </a:p>
@@ -1608,7 +1608,7 @@
           <a:p>
             <a:fld id="{ADCB3C24-BD18-4717-A32D-B583A5D3181D}" type="datetimeFigureOut">
               <a:rPr lang="ko-KR" altLang="en-US" smtClean="0"/>
-              <a:t>2023-05-15</a:t>
+              <a:t>2023-05-16</a:t>
             </a:fld>
             <a:endParaRPr lang="ko-KR" altLang="en-US"/>
           </a:p>
@@ -1726,7 +1726,7 @@
           <a:p>
             <a:fld id="{ADCB3C24-BD18-4717-A32D-B583A5D3181D}" type="datetimeFigureOut">
               <a:rPr lang="ko-KR" altLang="en-US" smtClean="0"/>
-              <a:t>2023-05-15</a:t>
+              <a:t>2023-05-16</a:t>
             </a:fld>
             <a:endParaRPr lang="ko-KR" altLang="en-US"/>
           </a:p>
@@ -1821,7 +1821,7 @@
           <a:p>
             <a:fld id="{ADCB3C24-BD18-4717-A32D-B583A5D3181D}" type="datetimeFigureOut">
               <a:rPr lang="ko-KR" altLang="en-US" smtClean="0"/>
-              <a:t>2023-05-15</a:t>
+              <a:t>2023-05-16</a:t>
             </a:fld>
             <a:endParaRPr lang="ko-KR" altLang="en-US"/>
           </a:p>
@@ -2098,7 +2098,7 @@
           <a:p>
             <a:fld id="{ADCB3C24-BD18-4717-A32D-B583A5D3181D}" type="datetimeFigureOut">
               <a:rPr lang="ko-KR" altLang="en-US" smtClean="0"/>
-              <a:t>2023-05-15</a:t>
+              <a:t>2023-05-16</a:t>
             </a:fld>
             <a:endParaRPr lang="ko-KR" altLang="en-US"/>
           </a:p>
@@ -2351,7 +2351,7 @@
           <a:p>
             <a:fld id="{ADCB3C24-BD18-4717-A32D-B583A5D3181D}" type="datetimeFigureOut">
               <a:rPr lang="ko-KR" altLang="en-US" smtClean="0"/>
-              <a:t>2023-05-15</a:t>
+              <a:t>2023-05-16</a:t>
             </a:fld>
             <a:endParaRPr lang="ko-KR" altLang="en-US"/>
           </a:p>
@@ -2564,7 +2564,7 @@
           <a:p>
             <a:fld id="{ADCB3C24-BD18-4717-A32D-B583A5D3181D}" type="datetimeFigureOut">
               <a:rPr lang="ko-KR" altLang="en-US" smtClean="0"/>
-              <a:t>2023-05-15</a:t>
+              <a:t>2023-05-16</a:t>
             </a:fld>
             <a:endParaRPr lang="ko-KR" altLang="en-US"/>
           </a:p>

</xml_diff>